<commit_message>
updates to configuration management figure. Also formatting fix in general.rst
</commit_message>
<xml_diff>
--- a/source/_static/config-figure.pptx
+++ b/source/_static/config-figure.pptx
@@ -5,7 +5,7 @@
     <p:sldMasterId id="2147483648" r:id="rId1"/>
   </p:sldMasterIdLst>
   <p:sldIdLst>
-    <p:sldId id="289" r:id="rId2"/>
+    <p:sldId id="292" r:id="rId2"/>
   </p:sldIdLst>
   <p:sldSz cx="12192000" cy="6858000"/>
   <p:notesSz cx="6858000" cy="9144000"/>
@@ -104,6 +104,11 @@
       </a:defRPr>
     </a:lvl9pPr>
   </p:defaultTextStyle>
+  <p:extLst>
+    <p:ext uri="{EFAFB233-063F-42B5-8137-9DF3F51BA10A}">
+      <p15:sldGuideLst xmlns:p15="http://schemas.microsoft.com/office/powerpoint/2012/main"/>
+    </p:ext>
+  </p:extLst>
 </p:presentation>
 </file>
 
@@ -254,7 +259,7 @@
           <a:p>
             <a:fld id="{B06A5DAB-EB8B-C345-A062-C3CF8243084F}" type="datetimeFigureOut">
               <a:rPr lang="en-US" smtClean="0"/>
-              <a:t>2/24/25</a:t>
+              <a:t>6/16/25</a:t>
             </a:fld>
             <a:endParaRPr lang="en-US"/>
           </a:p>
@@ -452,7 +457,7 @@
           <a:p>
             <a:fld id="{B06A5DAB-EB8B-C345-A062-C3CF8243084F}" type="datetimeFigureOut">
               <a:rPr lang="en-US" smtClean="0"/>
-              <a:t>2/24/25</a:t>
+              <a:t>6/16/25</a:t>
             </a:fld>
             <a:endParaRPr lang="en-US"/>
           </a:p>
@@ -660,7 +665,7 @@
           <a:p>
             <a:fld id="{B06A5DAB-EB8B-C345-A062-C3CF8243084F}" type="datetimeFigureOut">
               <a:rPr lang="en-US" smtClean="0"/>
-              <a:t>2/24/25</a:t>
+              <a:t>6/16/25</a:t>
             </a:fld>
             <a:endParaRPr lang="en-US"/>
           </a:p>
@@ -858,7 +863,7 @@
           <a:p>
             <a:fld id="{B06A5DAB-EB8B-C345-A062-C3CF8243084F}" type="datetimeFigureOut">
               <a:rPr lang="en-US" smtClean="0"/>
-              <a:t>2/24/25</a:t>
+              <a:t>6/16/25</a:t>
             </a:fld>
             <a:endParaRPr lang="en-US"/>
           </a:p>
@@ -1133,7 +1138,7 @@
           <a:p>
             <a:fld id="{B06A5DAB-EB8B-C345-A062-C3CF8243084F}" type="datetimeFigureOut">
               <a:rPr lang="en-US" smtClean="0"/>
-              <a:t>2/24/25</a:t>
+              <a:t>6/16/25</a:t>
             </a:fld>
             <a:endParaRPr lang="en-US"/>
           </a:p>
@@ -1398,7 +1403,7 @@
           <a:p>
             <a:fld id="{B06A5DAB-EB8B-C345-A062-C3CF8243084F}" type="datetimeFigureOut">
               <a:rPr lang="en-US" smtClean="0"/>
-              <a:t>2/24/25</a:t>
+              <a:t>6/16/25</a:t>
             </a:fld>
             <a:endParaRPr lang="en-US"/>
           </a:p>
@@ -1810,7 +1815,7 @@
           <a:p>
             <a:fld id="{B06A5DAB-EB8B-C345-A062-C3CF8243084F}" type="datetimeFigureOut">
               <a:rPr lang="en-US" smtClean="0"/>
-              <a:t>2/24/25</a:t>
+              <a:t>6/16/25</a:t>
             </a:fld>
             <a:endParaRPr lang="en-US"/>
           </a:p>
@@ -1951,7 +1956,7 @@
           <a:p>
             <a:fld id="{B06A5DAB-EB8B-C345-A062-C3CF8243084F}" type="datetimeFigureOut">
               <a:rPr lang="en-US" smtClean="0"/>
-              <a:t>2/24/25</a:t>
+              <a:t>6/16/25</a:t>
             </a:fld>
             <a:endParaRPr lang="en-US"/>
           </a:p>
@@ -2064,7 +2069,7 @@
           <a:p>
             <a:fld id="{B06A5DAB-EB8B-C345-A062-C3CF8243084F}" type="datetimeFigureOut">
               <a:rPr lang="en-US" smtClean="0"/>
-              <a:t>2/24/25</a:t>
+              <a:t>6/16/25</a:t>
             </a:fld>
             <a:endParaRPr lang="en-US"/>
           </a:p>
@@ -2375,7 +2380,7 @@
           <a:p>
             <a:fld id="{B06A5DAB-EB8B-C345-A062-C3CF8243084F}" type="datetimeFigureOut">
               <a:rPr lang="en-US" smtClean="0"/>
-              <a:t>2/24/25</a:t>
+              <a:t>6/16/25</a:t>
             </a:fld>
             <a:endParaRPr lang="en-US"/>
           </a:p>
@@ -2663,7 +2668,7 @@
           <a:p>
             <a:fld id="{B06A5DAB-EB8B-C345-A062-C3CF8243084F}" type="datetimeFigureOut">
               <a:rPr lang="en-US" smtClean="0"/>
-              <a:t>2/24/25</a:t>
+              <a:t>6/16/25</a:t>
             </a:fld>
             <a:endParaRPr lang="en-US"/>
           </a:p>
@@ -2904,7 +2909,7 @@
           <a:p>
             <a:fld id="{B06A5DAB-EB8B-C345-A062-C3CF8243084F}" type="datetimeFigureOut">
               <a:rPr lang="en-US" smtClean="0"/>
-              <a:t>2/24/25</a:t>
+              <a:t>6/16/25</a:t>
             </a:fld>
             <a:endParaRPr lang="en-US"/>
           </a:p>
@@ -3309,7 +3314,13 @@
   <p:cSld>
     <p:spTree>
       <p:nvGrpSpPr>
-        <p:cNvPr id="1" name=""/>
+        <p:cNvPr id="1" name="">
+          <a:extLst>
+            <a:ext uri="{FF2B5EF4-FFF2-40B4-BE49-F238E27FC236}">
+              <a16:creationId xmlns:a16="http://schemas.microsoft.com/office/drawing/2014/main" id="{56100F7B-0907-9E14-BE6B-5374D7F85B75}"/>
+            </a:ext>
+          </a:extLst>
+        </p:cNvPr>
         <p:cNvGrpSpPr/>
         <p:nvPr/>
       </p:nvGrpSpPr>
@@ -3326,7 +3337,7 @@
           <p:cNvPr id="34" name="Group 33">
             <a:extLst>
               <a:ext uri="{FF2B5EF4-FFF2-40B4-BE49-F238E27FC236}">
-                <a16:creationId xmlns:a16="http://schemas.microsoft.com/office/drawing/2014/main" id="{9D9E3B3E-D543-BC67-CE96-9EB02A991C50}"/>
+                <a16:creationId xmlns:a16="http://schemas.microsoft.com/office/drawing/2014/main" id="{3A07340B-022E-BB63-4552-82C151B22ECA}"/>
               </a:ext>
             </a:extLst>
           </p:cNvPr>
@@ -3337,10 +3348,10 @@
         </p:nvGrpSpPr>
         <p:grpSpPr>
           <a:xfrm>
-            <a:off x="105849" y="204227"/>
-            <a:ext cx="11978640" cy="6509089"/>
-            <a:chOff x="3251561" y="2105529"/>
-            <a:chExt cx="13764912" cy="8132709"/>
+            <a:off x="48696" y="171453"/>
+            <a:ext cx="12086151" cy="6643687"/>
+            <a:chOff x="3251560" y="2064580"/>
+            <a:chExt cx="13888455" cy="8300881"/>
           </a:xfrm>
         </p:grpSpPr>
         <p:sp>
@@ -3348,7 +3359,7 @@
             <p:cNvPr id="35" name="Rectangle: Rounded Corners 11">
               <a:extLst>
                 <a:ext uri="{FF2B5EF4-FFF2-40B4-BE49-F238E27FC236}">
-                  <a16:creationId xmlns:a16="http://schemas.microsoft.com/office/drawing/2014/main" id="{23E1B1C8-1BF7-CE25-1702-6C926F3ECD8D}"/>
+                  <a16:creationId xmlns:a16="http://schemas.microsoft.com/office/drawing/2014/main" id="{0EFFDC07-3608-B1FF-7776-CEEBDDA0E0FA}"/>
                 </a:ext>
               </a:extLst>
             </p:cNvPr>
@@ -3357,8 +3368,8 @@
           </p:nvSpPr>
           <p:spPr>
             <a:xfrm>
-              <a:off x="3251561" y="2105529"/>
-              <a:ext cx="13764912" cy="8132709"/>
+              <a:off x="3251560" y="2064580"/>
+              <a:ext cx="13888455" cy="8300881"/>
             </a:xfrm>
             <a:prstGeom prst="roundRect">
               <a:avLst/>
@@ -3628,7 +3639,7 @@
             <p:cNvPr id="36" name="Group 35">
               <a:extLst>
                 <a:ext uri="{FF2B5EF4-FFF2-40B4-BE49-F238E27FC236}">
-                  <a16:creationId xmlns:a16="http://schemas.microsoft.com/office/drawing/2014/main" id="{DB001C7A-C6A5-40F5-B635-79E9201548A1}"/>
+                  <a16:creationId xmlns:a16="http://schemas.microsoft.com/office/drawing/2014/main" id="{41C35ACA-B246-43FB-7172-34675E4785B4}"/>
                 </a:ext>
               </a:extLst>
             </p:cNvPr>
@@ -3637,10 +3648,10 @@
           </p:nvGrpSpPr>
           <p:grpSpPr>
             <a:xfrm>
-              <a:off x="12234032" y="2319631"/>
-              <a:ext cx="4479406" cy="7607006"/>
-              <a:chOff x="2156073" y="2269701"/>
-              <a:chExt cx="4479406" cy="7607006"/>
+              <a:off x="12234031" y="2319631"/>
+              <a:ext cx="4597790" cy="7790654"/>
+              <a:chOff x="2156072" y="2269701"/>
+              <a:chExt cx="4597790" cy="7790654"/>
             </a:xfrm>
           </p:grpSpPr>
           <p:sp>
@@ -3648,7 +3659,7 @@
               <p:cNvPr id="60" name="Rectangle: Rounded Corners 4">
                 <a:extLst>
                   <a:ext uri="{FF2B5EF4-FFF2-40B4-BE49-F238E27FC236}">
-                    <a16:creationId xmlns:a16="http://schemas.microsoft.com/office/drawing/2014/main" id="{DDA8BF4E-7F44-0880-6786-6513D1EF0DA4}"/>
+                    <a16:creationId xmlns:a16="http://schemas.microsoft.com/office/drawing/2014/main" id="{E5593935-A2E2-A6A2-09F7-C3CDE5D54BEB}"/>
                   </a:ext>
                 </a:extLst>
               </p:cNvPr>
@@ -3657,8 +3668,8 @@
             </p:nvSpPr>
             <p:spPr>
               <a:xfrm>
-                <a:off x="2462302" y="3056179"/>
-                <a:ext cx="3948173" cy="2914519"/>
+                <a:off x="2252273" y="3056178"/>
+                <a:ext cx="4370121" cy="3138262"/>
               </a:xfrm>
               <a:prstGeom prst="roundRect">
                 <a:avLst/>
@@ -3926,11 +3937,9 @@
               <a:p>
                 <a:pPr algn="ctr"/>
                 <a:r>
-                  <a:rPr lang="en-US" sz="1800" b="1" dirty="0">
-                    <a:solidFill>
-                      <a:schemeClr val="accent2">
-                        <a:lumMod val="76000"/>
-                      </a:schemeClr>
+                  <a:rPr lang="en-US" sz="2000" b="1" dirty="0">
+                    <a:solidFill>
+                      <a:schemeClr val="tx1"/>
                     </a:solidFill>
                     <a:latin typeface="Arial"/>
                     <a:cs typeface="Arial"/>
@@ -3940,7 +3949,7 @@
               </a:p>
               <a:p>
                 <a:pPr algn="ctr"/>
-                <a:endParaRPr lang="en-US" sz="1800" b="1" dirty="0">
+                <a:endParaRPr lang="en-US" sz="2000" b="1" dirty="0">
                   <a:solidFill>
                     <a:schemeClr val="accent2">
                       <a:lumMod val="76000"/>
@@ -3953,7 +3962,7 @@
               <a:p>
                 <a:pPr algn="ctr"/>
                 <a:r>
-                  <a:rPr lang="en-US" sz="1800" b="1" dirty="0" err="1">
+                  <a:rPr lang="en-US" sz="1600" b="1" dirty="0" err="1">
                     <a:solidFill>
                       <a:schemeClr val="accent2">
                         <a:lumMod val="76000"/>
@@ -3964,7 +3973,53 @@
                   </a:rPr>
                   <a:t>config_stp</a:t>
                 </a:r>
-                <a:endParaRPr lang="en-US" sz="1800" b="1" dirty="0">
+                <a:r>
+                  <a:rPr lang="en-US" sz="1600" b="1" dirty="0">
+                    <a:solidFill>
+                      <a:schemeClr val="accent2">
+                        <a:lumMod val="76000"/>
+                      </a:schemeClr>
+                    </a:solidFill>
+                    <a:latin typeface="Arial"/>
+                    <a:cs typeface="Arial"/>
+                  </a:rPr>
+                  <a:t> </a:t>
+                </a:r>
+                <a:r>
+                  <a:rPr lang="en-US" sz="1600" dirty="0">
+                    <a:solidFill>
+                      <a:schemeClr val="tx1"/>
+                    </a:solidFill>
+                    <a:latin typeface="Arial"/>
+                    <a:cs typeface="Arial"/>
+                  </a:rPr>
+                  <a:t>&amp;</a:t>
+                </a:r>
+                <a:r>
+                  <a:rPr lang="en-US" sz="1600" b="1" dirty="0">
+                    <a:solidFill>
+                      <a:schemeClr val="accent2">
+                        <a:lumMod val="76000"/>
+                      </a:schemeClr>
+                    </a:solidFill>
+                    <a:latin typeface="Arial"/>
+                    <a:cs typeface="Arial"/>
+                  </a:rPr>
+                  <a:t> </a:t>
+                </a:r>
+                <a:r>
+                  <a:rPr lang="en-US" sz="1600" b="1" dirty="0" err="1">
+                    <a:solidFill>
+                      <a:schemeClr val="accent2">
+                        <a:lumMod val="76000"/>
+                      </a:schemeClr>
+                    </a:solidFill>
+                    <a:latin typeface="Arial"/>
+                    <a:cs typeface="Arial"/>
+                  </a:rPr>
+                  <a:t>config_um</a:t>
+                </a:r>
+                <a:endParaRPr lang="en-US" sz="1600" b="1" dirty="0">
                   <a:solidFill>
                     <a:schemeClr val="accent2">
                       <a:lumMod val="76000"/>
@@ -3976,7 +4031,7 @@
               </a:p>
               <a:p>
                 <a:pPr algn="ctr"/>
-                <a:endParaRPr lang="en-US" sz="1200" dirty="0">
+                <a:endParaRPr lang="en-US" sz="1800" dirty="0">
                   <a:solidFill>
                     <a:schemeClr val="tx1"/>
                   </a:solidFill>
@@ -3985,7 +4040,7 @@
               <a:p>
                 <a:pPr algn="ctr"/>
                 <a:r>
-                  <a:rPr lang="en-US" sz="1600" dirty="0" err="1">
+                  <a:rPr lang="en-US" sz="1800" dirty="0" err="1">
                     <a:solidFill>
                       <a:schemeClr val="tx1"/>
                     </a:solidFill>
@@ -3995,7 +4050,7 @@
                   <a:t>telescope.toml</a:t>
                 </a:r>
                 <a:r>
-                  <a:rPr lang="en-US" sz="1600" dirty="0">
+                  <a:rPr lang="en-US" sz="1800" dirty="0">
                     <a:solidFill>
                       <a:schemeClr val="tx1"/>
                     </a:solidFill>
@@ -4008,7 +4063,7 @@
               <a:p>
                 <a:pPr algn="ctr"/>
                 <a:r>
-                  <a:rPr lang="en-US" sz="1600" dirty="0" err="1">
+                  <a:rPr lang="en-US" sz="1800" dirty="0" err="1">
                     <a:solidFill>
                       <a:schemeClr val="tx1"/>
                     </a:solidFill>
@@ -4018,7 +4073,7 @@
                   <a:t>observatory.toml</a:t>
                 </a:r>
                 <a:r>
-                  <a:rPr lang="en-US" sz="1600" dirty="0">
+                  <a:rPr lang="en-US" sz="1800" dirty="0">
                     <a:solidFill>
                       <a:schemeClr val="tx1"/>
                     </a:solidFill>
@@ -4031,7 +4086,7 @@
               <a:p>
                 <a:pPr algn="ctr"/>
                 <a:r>
-                  <a:rPr lang="en-US" sz="1600" dirty="0" err="1">
+                  <a:rPr lang="en-US" sz="1800" dirty="0" err="1">
                     <a:solidFill>
                       <a:schemeClr val="tx1"/>
                     </a:solidFill>
@@ -4041,7 +4096,7 @@
                   <a:t>astrophysics.toml</a:t>
                 </a:r>
                 <a:r>
-                  <a:rPr lang="en-US" sz="1600" dirty="0">
+                  <a:rPr lang="en-US" sz="1800" dirty="0">
                     <a:solidFill>
                       <a:schemeClr val="tx1"/>
                     </a:solidFill>
@@ -4068,7 +4123,7 @@
               <p:cNvPr id="61" name="Rectangle: Rounded Corners 5">
                 <a:extLst>
                   <a:ext uri="{FF2B5EF4-FFF2-40B4-BE49-F238E27FC236}">
-                    <a16:creationId xmlns:a16="http://schemas.microsoft.com/office/drawing/2014/main" id="{B9C6D8EB-BC7A-BF0E-FAB7-DB4903ACFC04}"/>
+                    <a16:creationId xmlns:a16="http://schemas.microsoft.com/office/drawing/2014/main" id="{4DEE742A-0218-3306-905D-04D4B06FC8EA}"/>
                   </a:ext>
                 </a:extLst>
               </p:cNvPr>
@@ -4077,8 +4132,8 @@
             </p:nvSpPr>
             <p:spPr>
               <a:xfrm>
-                <a:off x="2462303" y="7183521"/>
-                <a:ext cx="3948172" cy="2693186"/>
+                <a:off x="2303751" y="7129966"/>
+                <a:ext cx="4318643" cy="2930389"/>
               </a:xfrm>
               <a:prstGeom prst="roundRect">
                 <a:avLst/>
@@ -4346,11 +4401,9 @@
               <a:p>
                 <a:pPr algn="ctr"/>
                 <a:r>
-                  <a:rPr lang="en-US" sz="1800" b="1" dirty="0">
-                    <a:solidFill>
-                      <a:schemeClr val="accent2">
-                        <a:lumMod val="76000"/>
-                      </a:schemeClr>
+                  <a:rPr lang="en-US" sz="2000" b="1" dirty="0">
+                    <a:solidFill>
+                      <a:schemeClr val="tx1"/>
                     </a:solidFill>
                     <a:latin typeface="Arial"/>
                     <a:cs typeface="Arial"/>
@@ -4373,7 +4426,7 @@
               <a:p>
                 <a:pPr algn="ctr"/>
                 <a:r>
-                  <a:rPr lang="en-US" sz="1800" b="1" dirty="0">
+                  <a:rPr lang="en-US" sz="1600" b="1" dirty="0">
                     <a:solidFill>
                       <a:schemeClr val="accent2">
                         <a:lumMod val="76000"/>
@@ -4391,7 +4444,53 @@
                   </a:rPr>
                   <a:t>config_stp_wcc</a:t>
                 </a:r>
-                <a:endParaRPr lang="en-US" sz="1800" b="1" dirty="0">
+                <a:r>
+                  <a:rPr lang="en-US" sz="1600" b="1" dirty="0">
+                    <a:solidFill>
+                      <a:schemeClr val="accent2">
+                        <a:lumMod val="76000"/>
+                      </a:schemeClr>
+                    </a:solidFill>
+                    <a:latin typeface="Arial"/>
+                    <a:cs typeface="Arial"/>
+                  </a:rPr>
+                  <a:t> </a:t>
+                </a:r>
+                <a:r>
+                  <a:rPr lang="en-US" sz="1600" dirty="0">
+                    <a:solidFill>
+                      <a:schemeClr val="tx1"/>
+                    </a:solidFill>
+                    <a:latin typeface="Arial"/>
+                    <a:cs typeface="Arial"/>
+                  </a:rPr>
+                  <a:t>&amp;</a:t>
+                </a:r>
+                <a:r>
+                  <a:rPr lang="en-US" sz="1600" b="1" dirty="0">
+                    <a:solidFill>
+                      <a:schemeClr val="accent2">
+                        <a:lumMod val="76000"/>
+                      </a:schemeClr>
+                    </a:solidFill>
+                    <a:latin typeface="Arial"/>
+                    <a:cs typeface="Arial"/>
+                  </a:rPr>
+                  <a:t> </a:t>
+                </a:r>
+                <a:r>
+                  <a:rPr lang="en-US" sz="1600" b="1" dirty="0" err="1">
+                    <a:solidFill>
+                      <a:schemeClr val="accent2">
+                        <a:lumMod val="76000"/>
+                      </a:schemeClr>
+                    </a:solidFill>
+                    <a:latin typeface="Arial"/>
+                    <a:cs typeface="Arial"/>
+                  </a:rPr>
+                  <a:t>config_um_wcc</a:t>
+                </a:r>
+                <a:endParaRPr lang="en-US" sz="1600" b="1" dirty="0">
                   <a:solidFill>
                     <a:schemeClr val="accent2">
                       <a:lumMod val="76000"/>
@@ -4404,7 +4503,7 @@
               <a:p>
                 <a:pPr algn="ctr"/>
                 <a:r>
-                  <a:rPr lang="en-US" sz="1800" b="1" dirty="0">
+                  <a:rPr lang="en-US" sz="1600" b="1" dirty="0">
                     <a:solidFill>
                       <a:schemeClr val="accent2">
                         <a:lumMod val="76000"/>
@@ -4422,7 +4521,60 @@
                   </a:rPr>
                   <a:t>config_stp_esc</a:t>
                 </a:r>
-                <a:endParaRPr lang="en-US" sz="1800" b="1" dirty="0">
+                <a:r>
+                  <a:rPr lang="en-US" sz="1600" b="1" dirty="0">
+                    <a:solidFill>
+                      <a:schemeClr val="accent2">
+                        <a:lumMod val="76000"/>
+                      </a:schemeClr>
+                    </a:solidFill>
+                    <a:latin typeface="Arial"/>
+                    <a:cs typeface="Arial"/>
+                  </a:rPr>
+                  <a:t> </a:t>
+                </a:r>
+                <a:r>
+                  <a:rPr lang="en-US" sz="1600" dirty="0">
+                    <a:solidFill>
+                      <a:schemeClr val="tx1"/>
+                    </a:solidFill>
+                    <a:latin typeface="Arial"/>
+                    <a:cs typeface="Arial"/>
+                  </a:rPr>
+                  <a:t>&amp;</a:t>
+                </a:r>
+                <a:r>
+                  <a:rPr lang="en-US" sz="1600" b="1" dirty="0">
+                    <a:solidFill>
+                      <a:schemeClr val="accent2">
+                        <a:lumMod val="76000"/>
+                      </a:schemeClr>
+                    </a:solidFill>
+                    <a:latin typeface="Arial"/>
+                    <a:cs typeface="Arial"/>
+                  </a:rPr>
+                  <a:t> </a:t>
+                </a:r>
+                <a:r>
+                  <a:rPr lang="en-US" sz="1600" b="1" dirty="0">
+                    <a:solidFill>
+                      <a:schemeClr val="accent2">
+                        <a:lumMod val="76000"/>
+                      </a:schemeClr>
+                    </a:solidFill>
+                    <a:latin typeface="Arial"/>
+                    <a:cs typeface="Arial"/>
+                    <a:hlinkClick r:id="rId3">
+                      <a:extLst>
+                        <a:ext uri="{A12FA001-AC4F-418D-AE19-62706E023703}">
+                          <ahyp:hlinkClr xmlns:ahyp="http://schemas.microsoft.com/office/drawing/2018/hyperlinkcolor" val="tx"/>
+                        </a:ext>
+                      </a:extLst>
+                    </a:hlinkClick>
+                  </a:rPr>
+                  <a:t>config_um_esc</a:t>
+                </a:r>
+                <a:endParaRPr lang="en-US" sz="1600" b="1" dirty="0">
                   <a:solidFill>
                     <a:schemeClr val="accent2">
                       <a:lumMod val="76000"/>
@@ -4488,7 +4640,7 @@
               <p:cNvPr id="62" name="Rectangle: Rounded Corners 43">
                 <a:extLst>
                   <a:ext uri="{FF2B5EF4-FFF2-40B4-BE49-F238E27FC236}">
-                    <a16:creationId xmlns:a16="http://schemas.microsoft.com/office/drawing/2014/main" id="{C63242F1-B798-BEE6-60FB-E78141981C01}"/>
+                    <a16:creationId xmlns:a16="http://schemas.microsoft.com/office/drawing/2014/main" id="{0D8B707F-96AC-5942-FD9C-7D18A8A79151}"/>
                   </a:ext>
                 </a:extLst>
               </p:cNvPr>
@@ -4497,8 +4649,8 @@
             </p:nvSpPr>
             <p:spPr>
               <a:xfrm>
-                <a:off x="2156073" y="2269701"/>
-                <a:ext cx="4479406" cy="3815055"/>
+                <a:off x="2156072" y="2269701"/>
+                <a:ext cx="4597790" cy="4095153"/>
               </a:xfrm>
               <a:prstGeom prst="roundRect">
                 <a:avLst/>
@@ -4771,7 +4923,7 @@
               <p:cNvPr id="63" name="TextBox 44">
                 <a:extLst>
                   <a:ext uri="{FF2B5EF4-FFF2-40B4-BE49-F238E27FC236}">
-                    <a16:creationId xmlns:a16="http://schemas.microsoft.com/office/drawing/2014/main" id="{DCBFABFA-8E93-2D4A-BB31-F01DD333655F}"/>
+                    <a16:creationId xmlns:a16="http://schemas.microsoft.com/office/drawing/2014/main" id="{0C2BADA2-D05F-E136-3478-499B91C0E578}"/>
                   </a:ext>
                 </a:extLst>
               </p:cNvPr>
@@ -5062,7 +5214,7 @@
             <p:cNvPr id="37" name="Group 36">
               <a:extLst>
                 <a:ext uri="{FF2B5EF4-FFF2-40B4-BE49-F238E27FC236}">
-                  <a16:creationId xmlns:a16="http://schemas.microsoft.com/office/drawing/2014/main" id="{90608412-3A70-CF6A-67E9-6CB14FBBA77D}"/>
+                  <a16:creationId xmlns:a16="http://schemas.microsoft.com/office/drawing/2014/main" id="{15144AE9-E20F-0D1F-92BE-529B239D03DF}"/>
                 </a:ext>
               </a:extLst>
             </p:cNvPr>
@@ -5082,7 +5234,7 @@
               <p:cNvPr id="50" name="Rectangle: Rounded Corners 7">
                 <a:extLst>
                   <a:ext uri="{FF2B5EF4-FFF2-40B4-BE49-F238E27FC236}">
-                    <a16:creationId xmlns:a16="http://schemas.microsoft.com/office/drawing/2014/main" id="{F14DA4EE-22D4-729C-581B-CBB3DBB2304D}"/>
+                    <a16:creationId xmlns:a16="http://schemas.microsoft.com/office/drawing/2014/main" id="{509D3116-EAEA-588F-779B-AF82CAAB5591}"/>
                   </a:ext>
                 </a:extLst>
               </p:cNvPr>
@@ -5424,7 +5576,7 @@
               <p:cNvPr id="51" name="Arrow: Down 8">
                 <a:extLst>
                   <a:ext uri="{FF2B5EF4-FFF2-40B4-BE49-F238E27FC236}">
-                    <a16:creationId xmlns:a16="http://schemas.microsoft.com/office/drawing/2014/main" id="{F542C846-7135-EFE5-F965-D576CA10B7B3}"/>
+                    <a16:creationId xmlns:a16="http://schemas.microsoft.com/office/drawing/2014/main" id="{99F3A0C4-CA42-E239-1E2D-00D9E20C08BA}"/>
                   </a:ext>
                 </a:extLst>
               </p:cNvPr>
@@ -5699,7 +5851,7 @@
               <p:cNvPr id="52" name="Rectangle: Rounded Corners 13">
                 <a:extLst>
                   <a:ext uri="{FF2B5EF4-FFF2-40B4-BE49-F238E27FC236}">
-                    <a16:creationId xmlns:a16="http://schemas.microsoft.com/office/drawing/2014/main" id="{BF618921-08AA-3FF2-1B49-CD7CF0D16DDD}"/>
+                    <a16:creationId xmlns:a16="http://schemas.microsoft.com/office/drawing/2014/main" id="{1ABDB0FB-B20D-1BEE-A4FC-EDBE8A4D88AB}"/>
                   </a:ext>
                 </a:extLst>
               </p:cNvPr>
@@ -5994,7 +6146,7 @@
               <p:cNvPr id="53" name="Arrow: Down 37">
                 <a:extLst>
                   <a:ext uri="{FF2B5EF4-FFF2-40B4-BE49-F238E27FC236}">
-                    <a16:creationId xmlns:a16="http://schemas.microsoft.com/office/drawing/2014/main" id="{47155DB5-0144-51BE-07AE-F57F7333159C}"/>
+                    <a16:creationId xmlns:a16="http://schemas.microsoft.com/office/drawing/2014/main" id="{4E980D38-0A98-8D80-1CFF-29DF83D14105}"/>
                   </a:ext>
                 </a:extLst>
               </p:cNvPr>
@@ -6269,7 +6421,7 @@
               <p:cNvPr id="54" name="TextBox 38">
                 <a:extLst>
                   <a:ext uri="{FF2B5EF4-FFF2-40B4-BE49-F238E27FC236}">
-                    <a16:creationId xmlns:a16="http://schemas.microsoft.com/office/drawing/2014/main" id="{D9D9F06E-DAC7-F7BB-0E3C-A606C910B980}"/>
+                    <a16:creationId xmlns:a16="http://schemas.microsoft.com/office/drawing/2014/main" id="{9151356B-46F5-FBC3-7E4C-E3A4C0D0CBAE}"/>
                   </a:ext>
                 </a:extLst>
               </p:cNvPr>
@@ -6547,7 +6699,7 @@
               <p:cNvPr id="55" name="Arrow: Down 39">
                 <a:extLst>
                   <a:ext uri="{FF2B5EF4-FFF2-40B4-BE49-F238E27FC236}">
-                    <a16:creationId xmlns:a16="http://schemas.microsoft.com/office/drawing/2014/main" id="{9F6E178E-2DAC-A526-A96F-93BDB6656CF1}"/>
+                    <a16:creationId xmlns:a16="http://schemas.microsoft.com/office/drawing/2014/main" id="{95E4DDBC-5CA5-D799-988B-F160B25736FD}"/>
                   </a:ext>
                 </a:extLst>
               </p:cNvPr>
@@ -6822,7 +6974,7 @@
               <p:cNvPr id="56" name="TextBox 40">
                 <a:extLst>
                   <a:ext uri="{FF2B5EF4-FFF2-40B4-BE49-F238E27FC236}">
-                    <a16:creationId xmlns:a16="http://schemas.microsoft.com/office/drawing/2014/main" id="{1950F117-1D5F-5056-378B-C5C2274663DB}"/>
+                    <a16:creationId xmlns:a16="http://schemas.microsoft.com/office/drawing/2014/main" id="{3AB62B55-7344-B038-E478-19443070DC8A}"/>
                   </a:ext>
                 </a:extLst>
               </p:cNvPr>
@@ -6831,7 +6983,7 @@
             </p:nvSpPr>
             <p:spPr>
               <a:xfrm>
-                <a:off x="14703336" y="4865231"/>
+                <a:off x="14703336" y="4785523"/>
                 <a:ext cx="1792768" cy="653731"/>
               </a:xfrm>
               <a:prstGeom prst="rect">
@@ -7078,7 +7230,7 @@
               <a:p>
                 <a:pPr algn="ctr"/>
                 <a:r>
-                  <a:rPr lang="en-US"/>
+                  <a:rPr lang="en-US" dirty="0"/>
                   <a:t>Specified Configuration</a:t>
                 </a:r>
               </a:p>
@@ -7089,7 +7241,7 @@
               <p:cNvPr id="57" name="Rectangle: Rounded Corners 41">
                 <a:extLst>
                   <a:ext uri="{FF2B5EF4-FFF2-40B4-BE49-F238E27FC236}">
-                    <a16:creationId xmlns:a16="http://schemas.microsoft.com/office/drawing/2014/main" id="{00FC1A4D-7870-5082-566B-35FA93688312}"/>
+                    <a16:creationId xmlns:a16="http://schemas.microsoft.com/office/drawing/2014/main" id="{B9ABCB32-25EC-600C-0084-472518CCF675}"/>
                   </a:ext>
                 </a:extLst>
               </p:cNvPr>
@@ -7385,7 +7537,7 @@
               <p:cNvPr id="58" name="Arrow: Down 42">
                 <a:extLst>
                   <a:ext uri="{FF2B5EF4-FFF2-40B4-BE49-F238E27FC236}">
-                    <a16:creationId xmlns:a16="http://schemas.microsoft.com/office/drawing/2014/main" id="{F8DF29B5-2D89-4BB8-A0B9-FF72125A0FA7}"/>
+                    <a16:creationId xmlns:a16="http://schemas.microsoft.com/office/drawing/2014/main" id="{4BE660DB-73CB-6AC8-13A3-65535AFC983E}"/>
                   </a:ext>
                 </a:extLst>
               </p:cNvPr>
@@ -7660,7 +7812,7 @@
               <p:cNvPr id="59" name="TextBox 45">
                 <a:extLst>
                   <a:ext uri="{FF2B5EF4-FFF2-40B4-BE49-F238E27FC236}">
-                    <a16:creationId xmlns:a16="http://schemas.microsoft.com/office/drawing/2014/main" id="{7B1D1682-348E-FECD-E734-E1DDEBE407CE}"/>
+                    <a16:creationId xmlns:a16="http://schemas.microsoft.com/office/drawing/2014/main" id="{5E370F21-C20D-2509-C57D-3C71422339B0}"/>
                   </a:ext>
                 </a:extLst>
               </p:cNvPr>
@@ -7669,7 +7821,7 @@
             </p:nvSpPr>
             <p:spPr>
               <a:xfrm>
-                <a:off x="14668490" y="6605728"/>
+                <a:off x="14668490" y="6526020"/>
                 <a:ext cx="1842744" cy="384549"/>
               </a:xfrm>
               <a:prstGeom prst="rect">
@@ -7916,7 +8068,7 @@
               <a:p>
                 <a:pPr algn="ctr"/>
                 <a:r>
-                  <a:rPr lang="en-US"/>
+                  <a:rPr lang="en-US" dirty="0"/>
                   <a:t>Output</a:t>
                 </a:r>
               </a:p>
@@ -7928,7 +8080,7 @@
             <p:cNvPr id="38" name="Group 37">
               <a:extLst>
                 <a:ext uri="{FF2B5EF4-FFF2-40B4-BE49-F238E27FC236}">
-                  <a16:creationId xmlns:a16="http://schemas.microsoft.com/office/drawing/2014/main" id="{B7960A49-39C8-9343-64EC-EC67624FC62D}"/>
+                  <a16:creationId xmlns:a16="http://schemas.microsoft.com/office/drawing/2014/main" id="{DA040CF4-1CCC-EB71-F20A-904A801561B0}"/>
                 </a:ext>
               </a:extLst>
             </p:cNvPr>
@@ -7948,7 +8100,7 @@
               <p:cNvPr id="39" name="Rectangle: Rounded Corners 6">
                 <a:extLst>
                   <a:ext uri="{FF2B5EF4-FFF2-40B4-BE49-F238E27FC236}">
-                    <a16:creationId xmlns:a16="http://schemas.microsoft.com/office/drawing/2014/main" id="{88C4A534-62AC-AA23-30B8-58A5F4B79D89}"/>
+                    <a16:creationId xmlns:a16="http://schemas.microsoft.com/office/drawing/2014/main" id="{A7B9127D-3209-0001-515F-874F7DEBDF8C}"/>
                   </a:ext>
                 </a:extLst>
               </p:cNvPr>
@@ -8240,45 +8392,51 @@
                 <a:r>
                   <a:rPr lang="en-US" sz="1800" b="1" dirty="0">
                     <a:solidFill>
-                      <a:schemeClr val="accent2">
-                        <a:lumMod val="76000"/>
-                      </a:schemeClr>
+                      <a:schemeClr val="tx1"/>
                     </a:solidFill>
                     <a:latin typeface="Arial"/>
                     <a:cs typeface="Arial"/>
                   </a:rPr>
-                  <a:t>ETC_WCC, ETC_ESC</a:t>
+                  <a:t>Simulation Tools</a:t>
                 </a:r>
               </a:p>
               <a:p>
                 <a:pPr algn="ctr"/>
-                <a:r>
-                  <a:rPr lang="en-US" sz="1800" b="1" dirty="0">
-                    <a:solidFill>
-                      <a:schemeClr val="tx1"/>
-                    </a:solidFill>
-                    <a:latin typeface="Arial"/>
-                    <a:cs typeface="Arial"/>
-                  </a:rPr>
-                  <a:t>Performance Simulators</a:t>
-                </a:r>
-                <a:endParaRPr lang="en-US" sz="1200" dirty="0">
+                <a:endParaRPr lang="en-US" sz="1800" b="1" dirty="0">
                   <a:solidFill>
-                    <a:schemeClr val="tx1"/>
+                    <a:schemeClr val="accent2">
+                      <a:lumMod val="76000"/>
+                    </a:schemeClr>
                   </a:solidFill>
+                  <a:latin typeface="Arial"/>
+                  <a:cs typeface="Arial"/>
                 </a:endParaRPr>
               </a:p>
               <a:p>
                 <a:pPr algn="ctr"/>
                 <a:r>
-                  <a:rPr lang="en-US" b="1" dirty="0">
-                    <a:solidFill>
-                      <a:schemeClr val="tx1"/>
+                  <a:rPr lang="en-US" sz="1600" b="1" dirty="0" err="1">
+                    <a:solidFill>
+                      <a:schemeClr val="accent2">
+                        <a:lumMod val="76000"/>
+                      </a:schemeClr>
                     </a:solidFill>
                     <a:latin typeface="Arial"/>
                     <a:cs typeface="Arial"/>
                   </a:rPr>
-                  <a:t>(WCC ETC, ESC ETC, WCC E2ES)</a:t>
+                  <a:t>STP_ETC_Imaging</a:t>
+                </a:r>
+                <a:r>
+                  <a:rPr lang="en-US" sz="1600" b="1" dirty="0">
+                    <a:solidFill>
+                      <a:schemeClr val="accent2">
+                        <a:lumMod val="76000"/>
+                      </a:schemeClr>
+                    </a:solidFill>
+                    <a:latin typeface="Arial"/>
+                    <a:cs typeface="Arial"/>
+                  </a:rPr>
+                  <a:t> &amp; STP_ETC_ESC</a:t>
                 </a:r>
                 <a:br>
                   <a:rPr lang="en-US" b="1" dirty="0">
@@ -8307,7 +8465,7 @@
               <p:cNvPr id="40" name="TextBox 25">
                 <a:extLst>
                   <a:ext uri="{FF2B5EF4-FFF2-40B4-BE49-F238E27FC236}">
-                    <a16:creationId xmlns:a16="http://schemas.microsoft.com/office/drawing/2014/main" id="{1F65BFCD-790A-7AB6-C277-1F3873DD0841}"/>
+                    <a16:creationId xmlns:a16="http://schemas.microsoft.com/office/drawing/2014/main" id="{8100EB37-D237-96A5-6DE8-B41224179CF3}"/>
                   </a:ext>
                 </a:extLst>
               </p:cNvPr>
@@ -8581,7 +8739,7 @@
               <p:cNvPr id="41" name="Rectangle: Rounded Corners 46">
                 <a:extLst>
                   <a:ext uri="{FF2B5EF4-FFF2-40B4-BE49-F238E27FC236}">
-                    <a16:creationId xmlns:a16="http://schemas.microsoft.com/office/drawing/2014/main" id="{505F4FE9-9003-A798-85B5-2047E44E1C0F}"/>
+                    <a16:creationId xmlns:a16="http://schemas.microsoft.com/office/drawing/2014/main" id="{D59A5F7A-6C18-D9EF-22CE-5833B54312FE}"/>
                   </a:ext>
                 </a:extLst>
               </p:cNvPr>
@@ -8867,7 +9025,7 @@
               <p:cNvPr id="42" name="TextBox 47">
                 <a:extLst>
                   <a:ext uri="{FF2B5EF4-FFF2-40B4-BE49-F238E27FC236}">
-                    <a16:creationId xmlns:a16="http://schemas.microsoft.com/office/drawing/2014/main" id="{DD3A144F-8B28-5E53-A7D2-515F68A18F48}"/>
+                    <a16:creationId xmlns:a16="http://schemas.microsoft.com/office/drawing/2014/main" id="{C7A8AC92-CFAF-E166-7DC2-43403523760E}"/>
                   </a:ext>
                 </a:extLst>
               </p:cNvPr>
@@ -9152,7 +9310,7 @@
               <p:cNvPr id="43" name="Group 42">
                 <a:extLst>
                   <a:ext uri="{FF2B5EF4-FFF2-40B4-BE49-F238E27FC236}">
-                    <a16:creationId xmlns:a16="http://schemas.microsoft.com/office/drawing/2014/main" id="{AE6B6DD9-AEEC-753D-30FD-18C55A69D808}"/>
+                    <a16:creationId xmlns:a16="http://schemas.microsoft.com/office/drawing/2014/main" id="{13E109C7-CF58-6395-F80E-5326646B6112}"/>
                   </a:ext>
                 </a:extLst>
               </p:cNvPr>
@@ -9161,10 +9319,10 @@
             </p:nvGrpSpPr>
             <p:grpSpPr>
               <a:xfrm>
-                <a:off x="8969849" y="4506309"/>
-                <a:ext cx="2400712" cy="823844"/>
-                <a:chOff x="8969849" y="4506309"/>
-                <a:chExt cx="2400712" cy="823844"/>
+                <a:off x="8999162" y="4516115"/>
+                <a:ext cx="2161370" cy="814038"/>
+                <a:chOff x="8999162" y="4516115"/>
+                <a:chExt cx="2161370" cy="814038"/>
               </a:xfrm>
             </p:grpSpPr>
             <p:cxnSp>
@@ -9172,7 +9330,7 @@
                 <p:cNvPr id="48" name="Straight Arrow Connector 47">
                   <a:extLst>
                     <a:ext uri="{FF2B5EF4-FFF2-40B4-BE49-F238E27FC236}">
-                      <a16:creationId xmlns:a16="http://schemas.microsoft.com/office/drawing/2014/main" id="{2AB1F7EF-8709-C64C-B30F-E9A10819817B}"/>
+                      <a16:creationId xmlns:a16="http://schemas.microsoft.com/office/drawing/2014/main" id="{68CCBC3A-B9D7-B9FD-3528-D897C1ECDF34}"/>
                     </a:ext>
                   </a:extLst>
                 </p:cNvPr>
@@ -9212,20 +9370,19 @@
                 <p:cNvPr id="49" name="Straight Arrow Connector 48">
                   <a:extLst>
                     <a:ext uri="{FF2B5EF4-FFF2-40B4-BE49-F238E27FC236}">
-                      <a16:creationId xmlns:a16="http://schemas.microsoft.com/office/drawing/2014/main" id="{0F091278-C825-171B-6108-D9F53C069C9C}"/>
+                      <a16:creationId xmlns:a16="http://schemas.microsoft.com/office/drawing/2014/main" id="{90E2796E-4306-E355-7A3C-8195C9BE722D}"/>
                     </a:ext>
                   </a:extLst>
                 </p:cNvPr>
                 <p:cNvCxnSpPr>
                   <a:cxnSpLocks/>
-                  <a:endCxn id="60" idx="1"/>
                 </p:cNvCxnSpPr>
                 <p:nvPr/>
               </p:nvCxnSpPr>
               <p:spPr>
-                <a:xfrm flipV="1">
-                  <a:off x="8969849" y="4506309"/>
-                  <a:ext cx="2400712" cy="9806"/>
+                <a:xfrm>
+                  <a:off x="9043157" y="4516115"/>
+                  <a:ext cx="2117375" cy="0"/>
                 </a:xfrm>
                 <a:prstGeom prst="straightConnector1">
                   <a:avLst/>
@@ -9255,7 +9412,7 @@
               <p:cNvPr id="44" name="TextBox 52">
                 <a:extLst>
                   <a:ext uri="{FF2B5EF4-FFF2-40B4-BE49-F238E27FC236}">
-                    <a16:creationId xmlns:a16="http://schemas.microsoft.com/office/drawing/2014/main" id="{00D3D4E6-738E-7387-258D-CC254A1D420C}"/>
+                    <a16:creationId xmlns:a16="http://schemas.microsoft.com/office/drawing/2014/main" id="{AF0FF5CC-C16E-6A38-AFD0-D9C8450E31DC}"/>
                   </a:ext>
                 </a:extLst>
               </p:cNvPr>
@@ -9529,7 +9686,7 @@
               <p:cNvPr id="45" name="Group 44">
                 <a:extLst>
                   <a:ext uri="{FF2B5EF4-FFF2-40B4-BE49-F238E27FC236}">
-                    <a16:creationId xmlns:a16="http://schemas.microsoft.com/office/drawing/2014/main" id="{918AA6A9-53BE-5A99-5A7C-80371484B0F0}"/>
+                    <a16:creationId xmlns:a16="http://schemas.microsoft.com/office/drawing/2014/main" id="{CF88D667-1785-9CDB-E165-6486BDD4DACA}"/>
                   </a:ext>
                 </a:extLst>
               </p:cNvPr>
@@ -9549,7 +9706,7 @@
                 <p:cNvPr id="46" name="Straight Arrow Connector 45">
                   <a:extLst>
                     <a:ext uri="{FF2B5EF4-FFF2-40B4-BE49-F238E27FC236}">
-                      <a16:creationId xmlns:a16="http://schemas.microsoft.com/office/drawing/2014/main" id="{E73A3027-9A41-A508-D41B-721EDC5A6937}"/>
+                      <a16:creationId xmlns:a16="http://schemas.microsoft.com/office/drawing/2014/main" id="{5DDCCAAA-00A4-C1BB-D778-FD42DB774CF2}"/>
                     </a:ext>
                   </a:extLst>
                 </p:cNvPr>
@@ -9591,7 +9748,7 @@
                 <p:cNvPr id="47" name="Straight Arrow Connector 46">
                   <a:extLst>
                     <a:ext uri="{FF2B5EF4-FFF2-40B4-BE49-F238E27FC236}">
-                      <a16:creationId xmlns:a16="http://schemas.microsoft.com/office/drawing/2014/main" id="{C2573505-AF61-EA30-59AC-520842CD6D78}"/>
+                      <a16:creationId xmlns:a16="http://schemas.microsoft.com/office/drawing/2014/main" id="{DB156AFC-8F64-6034-EADA-8B0D69D7E379}"/>
                     </a:ext>
                   </a:extLst>
                 </p:cNvPr>
@@ -9635,7 +9792,7 @@
           <p:cNvPr id="64" name="Rectangle: Rounded Corners 43">
             <a:extLst>
               <a:ext uri="{FF2B5EF4-FFF2-40B4-BE49-F238E27FC236}">
-                <a16:creationId xmlns:a16="http://schemas.microsoft.com/office/drawing/2014/main" id="{57F35492-FAC7-D07A-A98F-8CD9AAB197A9}"/>
+                <a16:creationId xmlns:a16="http://schemas.microsoft.com/office/drawing/2014/main" id="{18031992-0B60-2D2E-8A44-20933790630A}"/>
               </a:ext>
             </a:extLst>
           </p:cNvPr>
@@ -9644,8 +9801,8 @@
         </p:nvSpPr>
         <p:spPr>
           <a:xfrm>
-            <a:off x="7942586" y="3709680"/>
-            <a:ext cx="3866808" cy="2810744"/>
+            <a:off x="7885434" y="3709679"/>
+            <a:ext cx="4001134" cy="2944093"/>
           </a:xfrm>
           <a:prstGeom prst="roundRect">
             <a:avLst/>
@@ -9917,7 +10074,7 @@
           <p:cNvPr id="65" name="TextBox 64">
             <a:extLst>
               <a:ext uri="{FF2B5EF4-FFF2-40B4-BE49-F238E27FC236}">
-                <a16:creationId xmlns:a16="http://schemas.microsoft.com/office/drawing/2014/main" id="{D8086CDD-CCDA-24F1-473C-B8B94093AC87}"/>
+                <a16:creationId xmlns:a16="http://schemas.microsoft.com/office/drawing/2014/main" id="{F57554ED-D81B-C076-5846-73F9DCDA32CB}"/>
               </a:ext>
             </a:extLst>
           </p:cNvPr>
@@ -9926,7 +10083,7 @@
         </p:nvSpPr>
         <p:spPr>
           <a:xfrm>
-            <a:off x="7448266" y="3711190"/>
+            <a:off x="7391114" y="3711190"/>
             <a:ext cx="4844729" cy="584775"/>
           </a:xfrm>
           <a:prstGeom prst="rect">
@@ -9977,7 +10134,7 @@
     </p:spTree>
     <p:extLst>
       <p:ext uri="{BB962C8B-B14F-4D97-AF65-F5344CB8AC3E}">
-        <p14:creationId xmlns:p14="http://schemas.microsoft.com/office/powerpoint/2010/main" val="4109138233"/>
+        <p14:creationId xmlns:p14="http://schemas.microsoft.com/office/powerpoint/2010/main" val="437186626"/>
       </p:ext>
     </p:extLst>
   </p:cSld>

</xml_diff>

<commit_message>
updates to configuration management figure.  (#15)
* updates to configuration management figure. Also formatting fix in general.rst
* link fix
</commit_message>
<xml_diff>
--- a/source/_static/config-figure.pptx
+++ b/source/_static/config-figure.pptx
@@ -5,7 +5,7 @@
     <p:sldMasterId id="2147483648" r:id="rId1"/>
   </p:sldMasterIdLst>
   <p:sldIdLst>
-    <p:sldId id="289" r:id="rId2"/>
+    <p:sldId id="292" r:id="rId2"/>
   </p:sldIdLst>
   <p:sldSz cx="12192000" cy="6858000"/>
   <p:notesSz cx="6858000" cy="9144000"/>
@@ -104,6 +104,11 @@
       </a:defRPr>
     </a:lvl9pPr>
   </p:defaultTextStyle>
+  <p:extLst>
+    <p:ext uri="{EFAFB233-063F-42B5-8137-9DF3F51BA10A}">
+      <p15:sldGuideLst xmlns:p15="http://schemas.microsoft.com/office/powerpoint/2012/main"/>
+    </p:ext>
+  </p:extLst>
 </p:presentation>
 </file>
 
@@ -254,7 +259,7 @@
           <a:p>
             <a:fld id="{B06A5DAB-EB8B-C345-A062-C3CF8243084F}" type="datetimeFigureOut">
               <a:rPr lang="en-US" smtClean="0"/>
-              <a:t>2/24/25</a:t>
+              <a:t>6/16/25</a:t>
             </a:fld>
             <a:endParaRPr lang="en-US"/>
           </a:p>
@@ -452,7 +457,7 @@
           <a:p>
             <a:fld id="{B06A5DAB-EB8B-C345-A062-C3CF8243084F}" type="datetimeFigureOut">
               <a:rPr lang="en-US" smtClean="0"/>
-              <a:t>2/24/25</a:t>
+              <a:t>6/16/25</a:t>
             </a:fld>
             <a:endParaRPr lang="en-US"/>
           </a:p>
@@ -660,7 +665,7 @@
           <a:p>
             <a:fld id="{B06A5DAB-EB8B-C345-A062-C3CF8243084F}" type="datetimeFigureOut">
               <a:rPr lang="en-US" smtClean="0"/>
-              <a:t>2/24/25</a:t>
+              <a:t>6/16/25</a:t>
             </a:fld>
             <a:endParaRPr lang="en-US"/>
           </a:p>
@@ -858,7 +863,7 @@
           <a:p>
             <a:fld id="{B06A5DAB-EB8B-C345-A062-C3CF8243084F}" type="datetimeFigureOut">
               <a:rPr lang="en-US" smtClean="0"/>
-              <a:t>2/24/25</a:t>
+              <a:t>6/16/25</a:t>
             </a:fld>
             <a:endParaRPr lang="en-US"/>
           </a:p>
@@ -1133,7 +1138,7 @@
           <a:p>
             <a:fld id="{B06A5DAB-EB8B-C345-A062-C3CF8243084F}" type="datetimeFigureOut">
               <a:rPr lang="en-US" smtClean="0"/>
-              <a:t>2/24/25</a:t>
+              <a:t>6/16/25</a:t>
             </a:fld>
             <a:endParaRPr lang="en-US"/>
           </a:p>
@@ -1398,7 +1403,7 @@
           <a:p>
             <a:fld id="{B06A5DAB-EB8B-C345-A062-C3CF8243084F}" type="datetimeFigureOut">
               <a:rPr lang="en-US" smtClean="0"/>
-              <a:t>2/24/25</a:t>
+              <a:t>6/16/25</a:t>
             </a:fld>
             <a:endParaRPr lang="en-US"/>
           </a:p>
@@ -1810,7 +1815,7 @@
           <a:p>
             <a:fld id="{B06A5DAB-EB8B-C345-A062-C3CF8243084F}" type="datetimeFigureOut">
               <a:rPr lang="en-US" smtClean="0"/>
-              <a:t>2/24/25</a:t>
+              <a:t>6/16/25</a:t>
             </a:fld>
             <a:endParaRPr lang="en-US"/>
           </a:p>
@@ -1951,7 +1956,7 @@
           <a:p>
             <a:fld id="{B06A5DAB-EB8B-C345-A062-C3CF8243084F}" type="datetimeFigureOut">
               <a:rPr lang="en-US" smtClean="0"/>
-              <a:t>2/24/25</a:t>
+              <a:t>6/16/25</a:t>
             </a:fld>
             <a:endParaRPr lang="en-US"/>
           </a:p>
@@ -2064,7 +2069,7 @@
           <a:p>
             <a:fld id="{B06A5DAB-EB8B-C345-A062-C3CF8243084F}" type="datetimeFigureOut">
               <a:rPr lang="en-US" smtClean="0"/>
-              <a:t>2/24/25</a:t>
+              <a:t>6/16/25</a:t>
             </a:fld>
             <a:endParaRPr lang="en-US"/>
           </a:p>
@@ -2375,7 +2380,7 @@
           <a:p>
             <a:fld id="{B06A5DAB-EB8B-C345-A062-C3CF8243084F}" type="datetimeFigureOut">
               <a:rPr lang="en-US" smtClean="0"/>
-              <a:t>2/24/25</a:t>
+              <a:t>6/16/25</a:t>
             </a:fld>
             <a:endParaRPr lang="en-US"/>
           </a:p>
@@ -2663,7 +2668,7 @@
           <a:p>
             <a:fld id="{B06A5DAB-EB8B-C345-A062-C3CF8243084F}" type="datetimeFigureOut">
               <a:rPr lang="en-US" smtClean="0"/>
-              <a:t>2/24/25</a:t>
+              <a:t>6/16/25</a:t>
             </a:fld>
             <a:endParaRPr lang="en-US"/>
           </a:p>
@@ -2904,7 +2909,7 @@
           <a:p>
             <a:fld id="{B06A5DAB-EB8B-C345-A062-C3CF8243084F}" type="datetimeFigureOut">
               <a:rPr lang="en-US" smtClean="0"/>
-              <a:t>2/24/25</a:t>
+              <a:t>6/16/25</a:t>
             </a:fld>
             <a:endParaRPr lang="en-US"/>
           </a:p>
@@ -3309,7 +3314,13 @@
   <p:cSld>
     <p:spTree>
       <p:nvGrpSpPr>
-        <p:cNvPr id="1" name=""/>
+        <p:cNvPr id="1" name="">
+          <a:extLst>
+            <a:ext uri="{FF2B5EF4-FFF2-40B4-BE49-F238E27FC236}">
+              <a16:creationId xmlns:a16="http://schemas.microsoft.com/office/drawing/2014/main" id="{56100F7B-0907-9E14-BE6B-5374D7F85B75}"/>
+            </a:ext>
+          </a:extLst>
+        </p:cNvPr>
         <p:cNvGrpSpPr/>
         <p:nvPr/>
       </p:nvGrpSpPr>
@@ -3326,7 +3337,7 @@
           <p:cNvPr id="34" name="Group 33">
             <a:extLst>
               <a:ext uri="{FF2B5EF4-FFF2-40B4-BE49-F238E27FC236}">
-                <a16:creationId xmlns:a16="http://schemas.microsoft.com/office/drawing/2014/main" id="{9D9E3B3E-D543-BC67-CE96-9EB02A991C50}"/>
+                <a16:creationId xmlns:a16="http://schemas.microsoft.com/office/drawing/2014/main" id="{3A07340B-022E-BB63-4552-82C151B22ECA}"/>
               </a:ext>
             </a:extLst>
           </p:cNvPr>
@@ -3337,10 +3348,10 @@
         </p:nvGrpSpPr>
         <p:grpSpPr>
           <a:xfrm>
-            <a:off x="105849" y="204227"/>
-            <a:ext cx="11978640" cy="6509089"/>
-            <a:chOff x="3251561" y="2105529"/>
-            <a:chExt cx="13764912" cy="8132709"/>
+            <a:off x="48696" y="171453"/>
+            <a:ext cx="12086151" cy="6643687"/>
+            <a:chOff x="3251560" y="2064580"/>
+            <a:chExt cx="13888455" cy="8300881"/>
           </a:xfrm>
         </p:grpSpPr>
         <p:sp>
@@ -3348,7 +3359,7 @@
             <p:cNvPr id="35" name="Rectangle: Rounded Corners 11">
               <a:extLst>
                 <a:ext uri="{FF2B5EF4-FFF2-40B4-BE49-F238E27FC236}">
-                  <a16:creationId xmlns:a16="http://schemas.microsoft.com/office/drawing/2014/main" id="{23E1B1C8-1BF7-CE25-1702-6C926F3ECD8D}"/>
+                  <a16:creationId xmlns:a16="http://schemas.microsoft.com/office/drawing/2014/main" id="{0EFFDC07-3608-B1FF-7776-CEEBDDA0E0FA}"/>
                 </a:ext>
               </a:extLst>
             </p:cNvPr>
@@ -3357,8 +3368,8 @@
           </p:nvSpPr>
           <p:spPr>
             <a:xfrm>
-              <a:off x="3251561" y="2105529"/>
-              <a:ext cx="13764912" cy="8132709"/>
+              <a:off x="3251560" y="2064580"/>
+              <a:ext cx="13888455" cy="8300881"/>
             </a:xfrm>
             <a:prstGeom prst="roundRect">
               <a:avLst/>
@@ -3628,7 +3639,7 @@
             <p:cNvPr id="36" name="Group 35">
               <a:extLst>
                 <a:ext uri="{FF2B5EF4-FFF2-40B4-BE49-F238E27FC236}">
-                  <a16:creationId xmlns:a16="http://schemas.microsoft.com/office/drawing/2014/main" id="{DB001C7A-C6A5-40F5-B635-79E9201548A1}"/>
+                  <a16:creationId xmlns:a16="http://schemas.microsoft.com/office/drawing/2014/main" id="{41C35ACA-B246-43FB-7172-34675E4785B4}"/>
                 </a:ext>
               </a:extLst>
             </p:cNvPr>
@@ -3637,10 +3648,10 @@
           </p:nvGrpSpPr>
           <p:grpSpPr>
             <a:xfrm>
-              <a:off x="12234032" y="2319631"/>
-              <a:ext cx="4479406" cy="7607006"/>
-              <a:chOff x="2156073" y="2269701"/>
-              <a:chExt cx="4479406" cy="7607006"/>
+              <a:off x="12234031" y="2319631"/>
+              <a:ext cx="4597790" cy="7790654"/>
+              <a:chOff x="2156072" y="2269701"/>
+              <a:chExt cx="4597790" cy="7790654"/>
             </a:xfrm>
           </p:grpSpPr>
           <p:sp>
@@ -3648,7 +3659,7 @@
               <p:cNvPr id="60" name="Rectangle: Rounded Corners 4">
                 <a:extLst>
                   <a:ext uri="{FF2B5EF4-FFF2-40B4-BE49-F238E27FC236}">
-                    <a16:creationId xmlns:a16="http://schemas.microsoft.com/office/drawing/2014/main" id="{DDA8BF4E-7F44-0880-6786-6513D1EF0DA4}"/>
+                    <a16:creationId xmlns:a16="http://schemas.microsoft.com/office/drawing/2014/main" id="{E5593935-A2E2-A6A2-09F7-C3CDE5D54BEB}"/>
                   </a:ext>
                 </a:extLst>
               </p:cNvPr>
@@ -3657,8 +3668,8 @@
             </p:nvSpPr>
             <p:spPr>
               <a:xfrm>
-                <a:off x="2462302" y="3056179"/>
-                <a:ext cx="3948173" cy="2914519"/>
+                <a:off x="2252273" y="3056178"/>
+                <a:ext cx="4370121" cy="3138262"/>
               </a:xfrm>
               <a:prstGeom prst="roundRect">
                 <a:avLst/>
@@ -3926,11 +3937,9 @@
               <a:p>
                 <a:pPr algn="ctr"/>
                 <a:r>
-                  <a:rPr lang="en-US" sz="1800" b="1" dirty="0">
-                    <a:solidFill>
-                      <a:schemeClr val="accent2">
-                        <a:lumMod val="76000"/>
-                      </a:schemeClr>
+                  <a:rPr lang="en-US" sz="2000" b="1" dirty="0">
+                    <a:solidFill>
+                      <a:schemeClr val="tx1"/>
                     </a:solidFill>
                     <a:latin typeface="Arial"/>
                     <a:cs typeface="Arial"/>
@@ -3940,7 +3949,7 @@
               </a:p>
               <a:p>
                 <a:pPr algn="ctr"/>
-                <a:endParaRPr lang="en-US" sz="1800" b="1" dirty="0">
+                <a:endParaRPr lang="en-US" sz="2000" b="1" dirty="0">
                   <a:solidFill>
                     <a:schemeClr val="accent2">
                       <a:lumMod val="76000"/>
@@ -3953,7 +3962,7 @@
               <a:p>
                 <a:pPr algn="ctr"/>
                 <a:r>
-                  <a:rPr lang="en-US" sz="1800" b="1" dirty="0" err="1">
+                  <a:rPr lang="en-US" sz="1600" b="1" dirty="0" err="1">
                     <a:solidFill>
                       <a:schemeClr val="accent2">
                         <a:lumMod val="76000"/>
@@ -3964,7 +3973,53 @@
                   </a:rPr>
                   <a:t>config_stp</a:t>
                 </a:r>
-                <a:endParaRPr lang="en-US" sz="1800" b="1" dirty="0">
+                <a:r>
+                  <a:rPr lang="en-US" sz="1600" b="1" dirty="0">
+                    <a:solidFill>
+                      <a:schemeClr val="accent2">
+                        <a:lumMod val="76000"/>
+                      </a:schemeClr>
+                    </a:solidFill>
+                    <a:latin typeface="Arial"/>
+                    <a:cs typeface="Arial"/>
+                  </a:rPr>
+                  <a:t> </a:t>
+                </a:r>
+                <a:r>
+                  <a:rPr lang="en-US" sz="1600" dirty="0">
+                    <a:solidFill>
+                      <a:schemeClr val="tx1"/>
+                    </a:solidFill>
+                    <a:latin typeface="Arial"/>
+                    <a:cs typeface="Arial"/>
+                  </a:rPr>
+                  <a:t>&amp;</a:t>
+                </a:r>
+                <a:r>
+                  <a:rPr lang="en-US" sz="1600" b="1" dirty="0">
+                    <a:solidFill>
+                      <a:schemeClr val="accent2">
+                        <a:lumMod val="76000"/>
+                      </a:schemeClr>
+                    </a:solidFill>
+                    <a:latin typeface="Arial"/>
+                    <a:cs typeface="Arial"/>
+                  </a:rPr>
+                  <a:t> </a:t>
+                </a:r>
+                <a:r>
+                  <a:rPr lang="en-US" sz="1600" b="1" dirty="0" err="1">
+                    <a:solidFill>
+                      <a:schemeClr val="accent2">
+                        <a:lumMod val="76000"/>
+                      </a:schemeClr>
+                    </a:solidFill>
+                    <a:latin typeface="Arial"/>
+                    <a:cs typeface="Arial"/>
+                  </a:rPr>
+                  <a:t>config_um</a:t>
+                </a:r>
+                <a:endParaRPr lang="en-US" sz="1600" b="1" dirty="0">
                   <a:solidFill>
                     <a:schemeClr val="accent2">
                       <a:lumMod val="76000"/>
@@ -3976,7 +4031,7 @@
               </a:p>
               <a:p>
                 <a:pPr algn="ctr"/>
-                <a:endParaRPr lang="en-US" sz="1200" dirty="0">
+                <a:endParaRPr lang="en-US" sz="1800" dirty="0">
                   <a:solidFill>
                     <a:schemeClr val="tx1"/>
                   </a:solidFill>
@@ -3985,7 +4040,7 @@
               <a:p>
                 <a:pPr algn="ctr"/>
                 <a:r>
-                  <a:rPr lang="en-US" sz="1600" dirty="0" err="1">
+                  <a:rPr lang="en-US" sz="1800" dirty="0" err="1">
                     <a:solidFill>
                       <a:schemeClr val="tx1"/>
                     </a:solidFill>
@@ -3995,7 +4050,7 @@
                   <a:t>telescope.toml</a:t>
                 </a:r>
                 <a:r>
-                  <a:rPr lang="en-US" sz="1600" dirty="0">
+                  <a:rPr lang="en-US" sz="1800" dirty="0">
                     <a:solidFill>
                       <a:schemeClr val="tx1"/>
                     </a:solidFill>
@@ -4008,7 +4063,7 @@
               <a:p>
                 <a:pPr algn="ctr"/>
                 <a:r>
-                  <a:rPr lang="en-US" sz="1600" dirty="0" err="1">
+                  <a:rPr lang="en-US" sz="1800" dirty="0" err="1">
                     <a:solidFill>
                       <a:schemeClr val="tx1"/>
                     </a:solidFill>
@@ -4018,7 +4073,7 @@
                   <a:t>observatory.toml</a:t>
                 </a:r>
                 <a:r>
-                  <a:rPr lang="en-US" sz="1600" dirty="0">
+                  <a:rPr lang="en-US" sz="1800" dirty="0">
                     <a:solidFill>
                       <a:schemeClr val="tx1"/>
                     </a:solidFill>
@@ -4031,7 +4086,7 @@
               <a:p>
                 <a:pPr algn="ctr"/>
                 <a:r>
-                  <a:rPr lang="en-US" sz="1600" dirty="0" err="1">
+                  <a:rPr lang="en-US" sz="1800" dirty="0" err="1">
                     <a:solidFill>
                       <a:schemeClr val="tx1"/>
                     </a:solidFill>
@@ -4041,7 +4096,7 @@
                   <a:t>astrophysics.toml</a:t>
                 </a:r>
                 <a:r>
-                  <a:rPr lang="en-US" sz="1600" dirty="0">
+                  <a:rPr lang="en-US" sz="1800" dirty="0">
                     <a:solidFill>
                       <a:schemeClr val="tx1"/>
                     </a:solidFill>
@@ -4068,7 +4123,7 @@
               <p:cNvPr id="61" name="Rectangle: Rounded Corners 5">
                 <a:extLst>
                   <a:ext uri="{FF2B5EF4-FFF2-40B4-BE49-F238E27FC236}">
-                    <a16:creationId xmlns:a16="http://schemas.microsoft.com/office/drawing/2014/main" id="{B9C6D8EB-BC7A-BF0E-FAB7-DB4903ACFC04}"/>
+                    <a16:creationId xmlns:a16="http://schemas.microsoft.com/office/drawing/2014/main" id="{4DEE742A-0218-3306-905D-04D4B06FC8EA}"/>
                   </a:ext>
                 </a:extLst>
               </p:cNvPr>
@@ -4077,8 +4132,8 @@
             </p:nvSpPr>
             <p:spPr>
               <a:xfrm>
-                <a:off x="2462303" y="7183521"/>
-                <a:ext cx="3948172" cy="2693186"/>
+                <a:off x="2303751" y="7129966"/>
+                <a:ext cx="4318643" cy="2930389"/>
               </a:xfrm>
               <a:prstGeom prst="roundRect">
                 <a:avLst/>
@@ -4346,11 +4401,9 @@
               <a:p>
                 <a:pPr algn="ctr"/>
                 <a:r>
-                  <a:rPr lang="en-US" sz="1800" b="1" dirty="0">
-                    <a:solidFill>
-                      <a:schemeClr val="accent2">
-                        <a:lumMod val="76000"/>
-                      </a:schemeClr>
+                  <a:rPr lang="en-US" sz="2000" b="1" dirty="0">
+                    <a:solidFill>
+                      <a:schemeClr val="tx1"/>
                     </a:solidFill>
                     <a:latin typeface="Arial"/>
                     <a:cs typeface="Arial"/>
@@ -4373,7 +4426,7 @@
               <a:p>
                 <a:pPr algn="ctr"/>
                 <a:r>
-                  <a:rPr lang="en-US" sz="1800" b="1" dirty="0">
+                  <a:rPr lang="en-US" sz="1600" b="1" dirty="0">
                     <a:solidFill>
                       <a:schemeClr val="accent2">
                         <a:lumMod val="76000"/>
@@ -4391,7 +4444,53 @@
                   </a:rPr>
                   <a:t>config_stp_wcc</a:t>
                 </a:r>
-                <a:endParaRPr lang="en-US" sz="1800" b="1" dirty="0">
+                <a:r>
+                  <a:rPr lang="en-US" sz="1600" b="1" dirty="0">
+                    <a:solidFill>
+                      <a:schemeClr val="accent2">
+                        <a:lumMod val="76000"/>
+                      </a:schemeClr>
+                    </a:solidFill>
+                    <a:latin typeface="Arial"/>
+                    <a:cs typeface="Arial"/>
+                  </a:rPr>
+                  <a:t> </a:t>
+                </a:r>
+                <a:r>
+                  <a:rPr lang="en-US" sz="1600" dirty="0">
+                    <a:solidFill>
+                      <a:schemeClr val="tx1"/>
+                    </a:solidFill>
+                    <a:latin typeface="Arial"/>
+                    <a:cs typeface="Arial"/>
+                  </a:rPr>
+                  <a:t>&amp;</a:t>
+                </a:r>
+                <a:r>
+                  <a:rPr lang="en-US" sz="1600" b="1" dirty="0">
+                    <a:solidFill>
+                      <a:schemeClr val="accent2">
+                        <a:lumMod val="76000"/>
+                      </a:schemeClr>
+                    </a:solidFill>
+                    <a:latin typeface="Arial"/>
+                    <a:cs typeface="Arial"/>
+                  </a:rPr>
+                  <a:t> </a:t>
+                </a:r>
+                <a:r>
+                  <a:rPr lang="en-US" sz="1600" b="1" dirty="0" err="1">
+                    <a:solidFill>
+                      <a:schemeClr val="accent2">
+                        <a:lumMod val="76000"/>
+                      </a:schemeClr>
+                    </a:solidFill>
+                    <a:latin typeface="Arial"/>
+                    <a:cs typeface="Arial"/>
+                  </a:rPr>
+                  <a:t>config_um_wcc</a:t>
+                </a:r>
+                <a:endParaRPr lang="en-US" sz="1600" b="1" dirty="0">
                   <a:solidFill>
                     <a:schemeClr val="accent2">
                       <a:lumMod val="76000"/>
@@ -4404,7 +4503,7 @@
               <a:p>
                 <a:pPr algn="ctr"/>
                 <a:r>
-                  <a:rPr lang="en-US" sz="1800" b="1" dirty="0">
+                  <a:rPr lang="en-US" sz="1600" b="1" dirty="0">
                     <a:solidFill>
                       <a:schemeClr val="accent2">
                         <a:lumMod val="76000"/>
@@ -4422,7 +4521,60 @@
                   </a:rPr>
                   <a:t>config_stp_esc</a:t>
                 </a:r>
-                <a:endParaRPr lang="en-US" sz="1800" b="1" dirty="0">
+                <a:r>
+                  <a:rPr lang="en-US" sz="1600" b="1" dirty="0">
+                    <a:solidFill>
+                      <a:schemeClr val="accent2">
+                        <a:lumMod val="76000"/>
+                      </a:schemeClr>
+                    </a:solidFill>
+                    <a:latin typeface="Arial"/>
+                    <a:cs typeface="Arial"/>
+                  </a:rPr>
+                  <a:t> </a:t>
+                </a:r>
+                <a:r>
+                  <a:rPr lang="en-US" sz="1600" dirty="0">
+                    <a:solidFill>
+                      <a:schemeClr val="tx1"/>
+                    </a:solidFill>
+                    <a:latin typeface="Arial"/>
+                    <a:cs typeface="Arial"/>
+                  </a:rPr>
+                  <a:t>&amp;</a:t>
+                </a:r>
+                <a:r>
+                  <a:rPr lang="en-US" sz="1600" b="1" dirty="0">
+                    <a:solidFill>
+                      <a:schemeClr val="accent2">
+                        <a:lumMod val="76000"/>
+                      </a:schemeClr>
+                    </a:solidFill>
+                    <a:latin typeface="Arial"/>
+                    <a:cs typeface="Arial"/>
+                  </a:rPr>
+                  <a:t> </a:t>
+                </a:r>
+                <a:r>
+                  <a:rPr lang="en-US" sz="1600" b="1" dirty="0">
+                    <a:solidFill>
+                      <a:schemeClr val="accent2">
+                        <a:lumMod val="76000"/>
+                      </a:schemeClr>
+                    </a:solidFill>
+                    <a:latin typeface="Arial"/>
+                    <a:cs typeface="Arial"/>
+                    <a:hlinkClick r:id="rId3">
+                      <a:extLst>
+                        <a:ext uri="{A12FA001-AC4F-418D-AE19-62706E023703}">
+                          <ahyp:hlinkClr xmlns:ahyp="http://schemas.microsoft.com/office/drawing/2018/hyperlinkcolor" val="tx"/>
+                        </a:ext>
+                      </a:extLst>
+                    </a:hlinkClick>
+                  </a:rPr>
+                  <a:t>config_um_esc</a:t>
+                </a:r>
+                <a:endParaRPr lang="en-US" sz="1600" b="1" dirty="0">
                   <a:solidFill>
                     <a:schemeClr val="accent2">
                       <a:lumMod val="76000"/>
@@ -4488,7 +4640,7 @@
               <p:cNvPr id="62" name="Rectangle: Rounded Corners 43">
                 <a:extLst>
                   <a:ext uri="{FF2B5EF4-FFF2-40B4-BE49-F238E27FC236}">
-                    <a16:creationId xmlns:a16="http://schemas.microsoft.com/office/drawing/2014/main" id="{C63242F1-B798-BEE6-60FB-E78141981C01}"/>
+                    <a16:creationId xmlns:a16="http://schemas.microsoft.com/office/drawing/2014/main" id="{0D8B707F-96AC-5942-FD9C-7D18A8A79151}"/>
                   </a:ext>
                 </a:extLst>
               </p:cNvPr>
@@ -4497,8 +4649,8 @@
             </p:nvSpPr>
             <p:spPr>
               <a:xfrm>
-                <a:off x="2156073" y="2269701"/>
-                <a:ext cx="4479406" cy="3815055"/>
+                <a:off x="2156072" y="2269701"/>
+                <a:ext cx="4597790" cy="4095153"/>
               </a:xfrm>
               <a:prstGeom prst="roundRect">
                 <a:avLst/>
@@ -4771,7 +4923,7 @@
               <p:cNvPr id="63" name="TextBox 44">
                 <a:extLst>
                   <a:ext uri="{FF2B5EF4-FFF2-40B4-BE49-F238E27FC236}">
-                    <a16:creationId xmlns:a16="http://schemas.microsoft.com/office/drawing/2014/main" id="{DCBFABFA-8E93-2D4A-BB31-F01DD333655F}"/>
+                    <a16:creationId xmlns:a16="http://schemas.microsoft.com/office/drawing/2014/main" id="{0C2BADA2-D05F-E136-3478-499B91C0E578}"/>
                   </a:ext>
                 </a:extLst>
               </p:cNvPr>
@@ -5062,7 +5214,7 @@
             <p:cNvPr id="37" name="Group 36">
               <a:extLst>
                 <a:ext uri="{FF2B5EF4-FFF2-40B4-BE49-F238E27FC236}">
-                  <a16:creationId xmlns:a16="http://schemas.microsoft.com/office/drawing/2014/main" id="{90608412-3A70-CF6A-67E9-6CB14FBBA77D}"/>
+                  <a16:creationId xmlns:a16="http://schemas.microsoft.com/office/drawing/2014/main" id="{15144AE9-E20F-0D1F-92BE-529B239D03DF}"/>
                 </a:ext>
               </a:extLst>
             </p:cNvPr>
@@ -5082,7 +5234,7 @@
               <p:cNvPr id="50" name="Rectangle: Rounded Corners 7">
                 <a:extLst>
                   <a:ext uri="{FF2B5EF4-FFF2-40B4-BE49-F238E27FC236}">
-                    <a16:creationId xmlns:a16="http://schemas.microsoft.com/office/drawing/2014/main" id="{F14DA4EE-22D4-729C-581B-CBB3DBB2304D}"/>
+                    <a16:creationId xmlns:a16="http://schemas.microsoft.com/office/drawing/2014/main" id="{509D3116-EAEA-588F-779B-AF82CAAB5591}"/>
                   </a:ext>
                 </a:extLst>
               </p:cNvPr>
@@ -5424,7 +5576,7 @@
               <p:cNvPr id="51" name="Arrow: Down 8">
                 <a:extLst>
                   <a:ext uri="{FF2B5EF4-FFF2-40B4-BE49-F238E27FC236}">
-                    <a16:creationId xmlns:a16="http://schemas.microsoft.com/office/drawing/2014/main" id="{F542C846-7135-EFE5-F965-D576CA10B7B3}"/>
+                    <a16:creationId xmlns:a16="http://schemas.microsoft.com/office/drawing/2014/main" id="{99F3A0C4-CA42-E239-1E2D-00D9E20C08BA}"/>
                   </a:ext>
                 </a:extLst>
               </p:cNvPr>
@@ -5699,7 +5851,7 @@
               <p:cNvPr id="52" name="Rectangle: Rounded Corners 13">
                 <a:extLst>
                   <a:ext uri="{FF2B5EF4-FFF2-40B4-BE49-F238E27FC236}">
-                    <a16:creationId xmlns:a16="http://schemas.microsoft.com/office/drawing/2014/main" id="{BF618921-08AA-3FF2-1B49-CD7CF0D16DDD}"/>
+                    <a16:creationId xmlns:a16="http://schemas.microsoft.com/office/drawing/2014/main" id="{1ABDB0FB-B20D-1BEE-A4FC-EDBE8A4D88AB}"/>
                   </a:ext>
                 </a:extLst>
               </p:cNvPr>
@@ -5994,7 +6146,7 @@
               <p:cNvPr id="53" name="Arrow: Down 37">
                 <a:extLst>
                   <a:ext uri="{FF2B5EF4-FFF2-40B4-BE49-F238E27FC236}">
-                    <a16:creationId xmlns:a16="http://schemas.microsoft.com/office/drawing/2014/main" id="{47155DB5-0144-51BE-07AE-F57F7333159C}"/>
+                    <a16:creationId xmlns:a16="http://schemas.microsoft.com/office/drawing/2014/main" id="{4E980D38-0A98-8D80-1CFF-29DF83D14105}"/>
                   </a:ext>
                 </a:extLst>
               </p:cNvPr>
@@ -6269,7 +6421,7 @@
               <p:cNvPr id="54" name="TextBox 38">
                 <a:extLst>
                   <a:ext uri="{FF2B5EF4-FFF2-40B4-BE49-F238E27FC236}">
-                    <a16:creationId xmlns:a16="http://schemas.microsoft.com/office/drawing/2014/main" id="{D9D9F06E-DAC7-F7BB-0E3C-A606C910B980}"/>
+                    <a16:creationId xmlns:a16="http://schemas.microsoft.com/office/drawing/2014/main" id="{9151356B-46F5-FBC3-7E4C-E3A4C0D0CBAE}"/>
                   </a:ext>
                 </a:extLst>
               </p:cNvPr>
@@ -6547,7 +6699,7 @@
               <p:cNvPr id="55" name="Arrow: Down 39">
                 <a:extLst>
                   <a:ext uri="{FF2B5EF4-FFF2-40B4-BE49-F238E27FC236}">
-                    <a16:creationId xmlns:a16="http://schemas.microsoft.com/office/drawing/2014/main" id="{9F6E178E-2DAC-A526-A96F-93BDB6656CF1}"/>
+                    <a16:creationId xmlns:a16="http://schemas.microsoft.com/office/drawing/2014/main" id="{95E4DDBC-5CA5-D799-988B-F160B25736FD}"/>
                   </a:ext>
                 </a:extLst>
               </p:cNvPr>
@@ -6822,7 +6974,7 @@
               <p:cNvPr id="56" name="TextBox 40">
                 <a:extLst>
                   <a:ext uri="{FF2B5EF4-FFF2-40B4-BE49-F238E27FC236}">
-                    <a16:creationId xmlns:a16="http://schemas.microsoft.com/office/drawing/2014/main" id="{1950F117-1D5F-5056-378B-C5C2274663DB}"/>
+                    <a16:creationId xmlns:a16="http://schemas.microsoft.com/office/drawing/2014/main" id="{3AB62B55-7344-B038-E478-19443070DC8A}"/>
                   </a:ext>
                 </a:extLst>
               </p:cNvPr>
@@ -6831,7 +6983,7 @@
             </p:nvSpPr>
             <p:spPr>
               <a:xfrm>
-                <a:off x="14703336" y="4865231"/>
+                <a:off x="14703336" y="4785523"/>
                 <a:ext cx="1792768" cy="653731"/>
               </a:xfrm>
               <a:prstGeom prst="rect">
@@ -7078,7 +7230,7 @@
               <a:p>
                 <a:pPr algn="ctr"/>
                 <a:r>
-                  <a:rPr lang="en-US"/>
+                  <a:rPr lang="en-US" dirty="0"/>
                   <a:t>Specified Configuration</a:t>
                 </a:r>
               </a:p>
@@ -7089,7 +7241,7 @@
               <p:cNvPr id="57" name="Rectangle: Rounded Corners 41">
                 <a:extLst>
                   <a:ext uri="{FF2B5EF4-FFF2-40B4-BE49-F238E27FC236}">
-                    <a16:creationId xmlns:a16="http://schemas.microsoft.com/office/drawing/2014/main" id="{00FC1A4D-7870-5082-566B-35FA93688312}"/>
+                    <a16:creationId xmlns:a16="http://schemas.microsoft.com/office/drawing/2014/main" id="{B9ABCB32-25EC-600C-0084-472518CCF675}"/>
                   </a:ext>
                 </a:extLst>
               </p:cNvPr>
@@ -7385,7 +7537,7 @@
               <p:cNvPr id="58" name="Arrow: Down 42">
                 <a:extLst>
                   <a:ext uri="{FF2B5EF4-FFF2-40B4-BE49-F238E27FC236}">
-                    <a16:creationId xmlns:a16="http://schemas.microsoft.com/office/drawing/2014/main" id="{F8DF29B5-2D89-4BB8-A0B9-FF72125A0FA7}"/>
+                    <a16:creationId xmlns:a16="http://schemas.microsoft.com/office/drawing/2014/main" id="{4BE660DB-73CB-6AC8-13A3-65535AFC983E}"/>
                   </a:ext>
                 </a:extLst>
               </p:cNvPr>
@@ -7660,7 +7812,7 @@
               <p:cNvPr id="59" name="TextBox 45">
                 <a:extLst>
                   <a:ext uri="{FF2B5EF4-FFF2-40B4-BE49-F238E27FC236}">
-                    <a16:creationId xmlns:a16="http://schemas.microsoft.com/office/drawing/2014/main" id="{7B1D1682-348E-FECD-E734-E1DDEBE407CE}"/>
+                    <a16:creationId xmlns:a16="http://schemas.microsoft.com/office/drawing/2014/main" id="{5E370F21-C20D-2509-C57D-3C71422339B0}"/>
                   </a:ext>
                 </a:extLst>
               </p:cNvPr>
@@ -7669,7 +7821,7 @@
             </p:nvSpPr>
             <p:spPr>
               <a:xfrm>
-                <a:off x="14668490" y="6605728"/>
+                <a:off x="14668490" y="6526020"/>
                 <a:ext cx="1842744" cy="384549"/>
               </a:xfrm>
               <a:prstGeom prst="rect">
@@ -7916,7 +8068,7 @@
               <a:p>
                 <a:pPr algn="ctr"/>
                 <a:r>
-                  <a:rPr lang="en-US"/>
+                  <a:rPr lang="en-US" dirty="0"/>
                   <a:t>Output</a:t>
                 </a:r>
               </a:p>
@@ -7928,7 +8080,7 @@
             <p:cNvPr id="38" name="Group 37">
               <a:extLst>
                 <a:ext uri="{FF2B5EF4-FFF2-40B4-BE49-F238E27FC236}">
-                  <a16:creationId xmlns:a16="http://schemas.microsoft.com/office/drawing/2014/main" id="{B7960A49-39C8-9343-64EC-EC67624FC62D}"/>
+                  <a16:creationId xmlns:a16="http://schemas.microsoft.com/office/drawing/2014/main" id="{DA040CF4-1CCC-EB71-F20A-904A801561B0}"/>
                 </a:ext>
               </a:extLst>
             </p:cNvPr>
@@ -7948,7 +8100,7 @@
               <p:cNvPr id="39" name="Rectangle: Rounded Corners 6">
                 <a:extLst>
                   <a:ext uri="{FF2B5EF4-FFF2-40B4-BE49-F238E27FC236}">
-                    <a16:creationId xmlns:a16="http://schemas.microsoft.com/office/drawing/2014/main" id="{88C4A534-62AC-AA23-30B8-58A5F4B79D89}"/>
+                    <a16:creationId xmlns:a16="http://schemas.microsoft.com/office/drawing/2014/main" id="{A7B9127D-3209-0001-515F-874F7DEBDF8C}"/>
                   </a:ext>
                 </a:extLst>
               </p:cNvPr>
@@ -8240,45 +8392,51 @@
                 <a:r>
                   <a:rPr lang="en-US" sz="1800" b="1" dirty="0">
                     <a:solidFill>
-                      <a:schemeClr val="accent2">
-                        <a:lumMod val="76000"/>
-                      </a:schemeClr>
+                      <a:schemeClr val="tx1"/>
                     </a:solidFill>
                     <a:latin typeface="Arial"/>
                     <a:cs typeface="Arial"/>
                   </a:rPr>
-                  <a:t>ETC_WCC, ETC_ESC</a:t>
+                  <a:t>Simulation Tools</a:t>
                 </a:r>
               </a:p>
               <a:p>
                 <a:pPr algn="ctr"/>
-                <a:r>
-                  <a:rPr lang="en-US" sz="1800" b="1" dirty="0">
-                    <a:solidFill>
-                      <a:schemeClr val="tx1"/>
-                    </a:solidFill>
-                    <a:latin typeface="Arial"/>
-                    <a:cs typeface="Arial"/>
-                  </a:rPr>
-                  <a:t>Performance Simulators</a:t>
-                </a:r>
-                <a:endParaRPr lang="en-US" sz="1200" dirty="0">
+                <a:endParaRPr lang="en-US" sz="1800" b="1" dirty="0">
                   <a:solidFill>
-                    <a:schemeClr val="tx1"/>
+                    <a:schemeClr val="accent2">
+                      <a:lumMod val="76000"/>
+                    </a:schemeClr>
                   </a:solidFill>
+                  <a:latin typeface="Arial"/>
+                  <a:cs typeface="Arial"/>
                 </a:endParaRPr>
               </a:p>
               <a:p>
                 <a:pPr algn="ctr"/>
                 <a:r>
-                  <a:rPr lang="en-US" b="1" dirty="0">
-                    <a:solidFill>
-                      <a:schemeClr val="tx1"/>
+                  <a:rPr lang="en-US" sz="1600" b="1" dirty="0" err="1">
+                    <a:solidFill>
+                      <a:schemeClr val="accent2">
+                        <a:lumMod val="76000"/>
+                      </a:schemeClr>
                     </a:solidFill>
                     <a:latin typeface="Arial"/>
                     <a:cs typeface="Arial"/>
                   </a:rPr>
-                  <a:t>(WCC ETC, ESC ETC, WCC E2ES)</a:t>
+                  <a:t>STP_ETC_Imaging</a:t>
+                </a:r>
+                <a:r>
+                  <a:rPr lang="en-US" sz="1600" b="1" dirty="0">
+                    <a:solidFill>
+                      <a:schemeClr val="accent2">
+                        <a:lumMod val="76000"/>
+                      </a:schemeClr>
+                    </a:solidFill>
+                    <a:latin typeface="Arial"/>
+                    <a:cs typeface="Arial"/>
+                  </a:rPr>
+                  <a:t> &amp; STP_ETC_ESC</a:t>
                 </a:r>
                 <a:br>
                   <a:rPr lang="en-US" b="1" dirty="0">
@@ -8307,7 +8465,7 @@
               <p:cNvPr id="40" name="TextBox 25">
                 <a:extLst>
                   <a:ext uri="{FF2B5EF4-FFF2-40B4-BE49-F238E27FC236}">
-                    <a16:creationId xmlns:a16="http://schemas.microsoft.com/office/drawing/2014/main" id="{1F65BFCD-790A-7AB6-C277-1F3873DD0841}"/>
+                    <a16:creationId xmlns:a16="http://schemas.microsoft.com/office/drawing/2014/main" id="{8100EB37-D237-96A5-6DE8-B41224179CF3}"/>
                   </a:ext>
                 </a:extLst>
               </p:cNvPr>
@@ -8581,7 +8739,7 @@
               <p:cNvPr id="41" name="Rectangle: Rounded Corners 46">
                 <a:extLst>
                   <a:ext uri="{FF2B5EF4-FFF2-40B4-BE49-F238E27FC236}">
-                    <a16:creationId xmlns:a16="http://schemas.microsoft.com/office/drawing/2014/main" id="{505F4FE9-9003-A798-85B5-2047E44E1C0F}"/>
+                    <a16:creationId xmlns:a16="http://schemas.microsoft.com/office/drawing/2014/main" id="{D59A5F7A-6C18-D9EF-22CE-5833B54312FE}"/>
                   </a:ext>
                 </a:extLst>
               </p:cNvPr>
@@ -8867,7 +9025,7 @@
               <p:cNvPr id="42" name="TextBox 47">
                 <a:extLst>
                   <a:ext uri="{FF2B5EF4-FFF2-40B4-BE49-F238E27FC236}">
-                    <a16:creationId xmlns:a16="http://schemas.microsoft.com/office/drawing/2014/main" id="{DD3A144F-8B28-5E53-A7D2-515F68A18F48}"/>
+                    <a16:creationId xmlns:a16="http://schemas.microsoft.com/office/drawing/2014/main" id="{C7A8AC92-CFAF-E166-7DC2-43403523760E}"/>
                   </a:ext>
                 </a:extLst>
               </p:cNvPr>
@@ -9152,7 +9310,7 @@
               <p:cNvPr id="43" name="Group 42">
                 <a:extLst>
                   <a:ext uri="{FF2B5EF4-FFF2-40B4-BE49-F238E27FC236}">
-                    <a16:creationId xmlns:a16="http://schemas.microsoft.com/office/drawing/2014/main" id="{AE6B6DD9-AEEC-753D-30FD-18C55A69D808}"/>
+                    <a16:creationId xmlns:a16="http://schemas.microsoft.com/office/drawing/2014/main" id="{13E109C7-CF58-6395-F80E-5326646B6112}"/>
                   </a:ext>
                 </a:extLst>
               </p:cNvPr>
@@ -9161,10 +9319,10 @@
             </p:nvGrpSpPr>
             <p:grpSpPr>
               <a:xfrm>
-                <a:off x="8969849" y="4506309"/>
-                <a:ext cx="2400712" cy="823844"/>
-                <a:chOff x="8969849" y="4506309"/>
-                <a:chExt cx="2400712" cy="823844"/>
+                <a:off x="8999162" y="4516115"/>
+                <a:ext cx="2161370" cy="814038"/>
+                <a:chOff x="8999162" y="4516115"/>
+                <a:chExt cx="2161370" cy="814038"/>
               </a:xfrm>
             </p:grpSpPr>
             <p:cxnSp>
@@ -9172,7 +9330,7 @@
                 <p:cNvPr id="48" name="Straight Arrow Connector 47">
                   <a:extLst>
                     <a:ext uri="{FF2B5EF4-FFF2-40B4-BE49-F238E27FC236}">
-                      <a16:creationId xmlns:a16="http://schemas.microsoft.com/office/drawing/2014/main" id="{2AB1F7EF-8709-C64C-B30F-E9A10819817B}"/>
+                      <a16:creationId xmlns:a16="http://schemas.microsoft.com/office/drawing/2014/main" id="{68CCBC3A-B9D7-B9FD-3528-D897C1ECDF34}"/>
                     </a:ext>
                   </a:extLst>
                 </p:cNvPr>
@@ -9212,20 +9370,19 @@
                 <p:cNvPr id="49" name="Straight Arrow Connector 48">
                   <a:extLst>
                     <a:ext uri="{FF2B5EF4-FFF2-40B4-BE49-F238E27FC236}">
-                      <a16:creationId xmlns:a16="http://schemas.microsoft.com/office/drawing/2014/main" id="{0F091278-C825-171B-6108-D9F53C069C9C}"/>
+                      <a16:creationId xmlns:a16="http://schemas.microsoft.com/office/drawing/2014/main" id="{90E2796E-4306-E355-7A3C-8195C9BE722D}"/>
                     </a:ext>
                   </a:extLst>
                 </p:cNvPr>
                 <p:cNvCxnSpPr>
                   <a:cxnSpLocks/>
-                  <a:endCxn id="60" idx="1"/>
                 </p:cNvCxnSpPr>
                 <p:nvPr/>
               </p:nvCxnSpPr>
               <p:spPr>
-                <a:xfrm flipV="1">
-                  <a:off x="8969849" y="4506309"/>
-                  <a:ext cx="2400712" cy="9806"/>
+                <a:xfrm>
+                  <a:off x="9043157" y="4516115"/>
+                  <a:ext cx="2117375" cy="0"/>
                 </a:xfrm>
                 <a:prstGeom prst="straightConnector1">
                   <a:avLst/>
@@ -9255,7 +9412,7 @@
               <p:cNvPr id="44" name="TextBox 52">
                 <a:extLst>
                   <a:ext uri="{FF2B5EF4-FFF2-40B4-BE49-F238E27FC236}">
-                    <a16:creationId xmlns:a16="http://schemas.microsoft.com/office/drawing/2014/main" id="{00D3D4E6-738E-7387-258D-CC254A1D420C}"/>
+                    <a16:creationId xmlns:a16="http://schemas.microsoft.com/office/drawing/2014/main" id="{AF0FF5CC-C16E-6A38-AFD0-D9C8450E31DC}"/>
                   </a:ext>
                 </a:extLst>
               </p:cNvPr>
@@ -9529,7 +9686,7 @@
               <p:cNvPr id="45" name="Group 44">
                 <a:extLst>
                   <a:ext uri="{FF2B5EF4-FFF2-40B4-BE49-F238E27FC236}">
-                    <a16:creationId xmlns:a16="http://schemas.microsoft.com/office/drawing/2014/main" id="{918AA6A9-53BE-5A99-5A7C-80371484B0F0}"/>
+                    <a16:creationId xmlns:a16="http://schemas.microsoft.com/office/drawing/2014/main" id="{CF88D667-1785-9CDB-E165-6486BDD4DACA}"/>
                   </a:ext>
                 </a:extLst>
               </p:cNvPr>
@@ -9549,7 +9706,7 @@
                 <p:cNvPr id="46" name="Straight Arrow Connector 45">
                   <a:extLst>
                     <a:ext uri="{FF2B5EF4-FFF2-40B4-BE49-F238E27FC236}">
-                      <a16:creationId xmlns:a16="http://schemas.microsoft.com/office/drawing/2014/main" id="{E73A3027-9A41-A508-D41B-721EDC5A6937}"/>
+                      <a16:creationId xmlns:a16="http://schemas.microsoft.com/office/drawing/2014/main" id="{5DDCCAAA-00A4-C1BB-D778-FD42DB774CF2}"/>
                     </a:ext>
                   </a:extLst>
                 </p:cNvPr>
@@ -9591,7 +9748,7 @@
                 <p:cNvPr id="47" name="Straight Arrow Connector 46">
                   <a:extLst>
                     <a:ext uri="{FF2B5EF4-FFF2-40B4-BE49-F238E27FC236}">
-                      <a16:creationId xmlns:a16="http://schemas.microsoft.com/office/drawing/2014/main" id="{C2573505-AF61-EA30-59AC-520842CD6D78}"/>
+                      <a16:creationId xmlns:a16="http://schemas.microsoft.com/office/drawing/2014/main" id="{DB156AFC-8F64-6034-EADA-8B0D69D7E379}"/>
                     </a:ext>
                   </a:extLst>
                 </p:cNvPr>
@@ -9635,7 +9792,7 @@
           <p:cNvPr id="64" name="Rectangle: Rounded Corners 43">
             <a:extLst>
               <a:ext uri="{FF2B5EF4-FFF2-40B4-BE49-F238E27FC236}">
-                <a16:creationId xmlns:a16="http://schemas.microsoft.com/office/drawing/2014/main" id="{57F35492-FAC7-D07A-A98F-8CD9AAB197A9}"/>
+                <a16:creationId xmlns:a16="http://schemas.microsoft.com/office/drawing/2014/main" id="{18031992-0B60-2D2E-8A44-20933790630A}"/>
               </a:ext>
             </a:extLst>
           </p:cNvPr>
@@ -9644,8 +9801,8 @@
         </p:nvSpPr>
         <p:spPr>
           <a:xfrm>
-            <a:off x="7942586" y="3709680"/>
-            <a:ext cx="3866808" cy="2810744"/>
+            <a:off x="7885434" y="3709679"/>
+            <a:ext cx="4001134" cy="2944093"/>
           </a:xfrm>
           <a:prstGeom prst="roundRect">
             <a:avLst/>
@@ -9917,7 +10074,7 @@
           <p:cNvPr id="65" name="TextBox 64">
             <a:extLst>
               <a:ext uri="{FF2B5EF4-FFF2-40B4-BE49-F238E27FC236}">
-                <a16:creationId xmlns:a16="http://schemas.microsoft.com/office/drawing/2014/main" id="{D8086CDD-CCDA-24F1-473C-B8B94093AC87}"/>
+                <a16:creationId xmlns:a16="http://schemas.microsoft.com/office/drawing/2014/main" id="{F57554ED-D81B-C076-5846-73F9DCDA32CB}"/>
               </a:ext>
             </a:extLst>
           </p:cNvPr>
@@ -9926,7 +10083,7 @@
         </p:nvSpPr>
         <p:spPr>
           <a:xfrm>
-            <a:off x="7448266" y="3711190"/>
+            <a:off x="7391114" y="3711190"/>
             <a:ext cx="4844729" cy="584775"/>
           </a:xfrm>
           <a:prstGeom prst="rect">
@@ -9977,7 +10134,7 @@
     </p:spTree>
     <p:extLst>
       <p:ext uri="{BB962C8B-B14F-4D97-AF65-F5344CB8AC3E}">
-        <p14:creationId xmlns:p14="http://schemas.microsoft.com/office/powerpoint/2010/main" val="4109138233"/>
+        <p14:creationId xmlns:p14="http://schemas.microsoft.com/office/powerpoint/2010/main" val="437186626"/>
       </p:ext>
     </p:extLst>
   </p:cSld>

</xml_diff>